<commit_message>
ADD : Realated paper.
</commit_message>
<xml_diff>
--- a/TermProject_중간보고/MDL.pptx
+++ b/TermProject_중간보고/MDL.pptx
@@ -2276,7 +2276,7 @@
     <mc:Choice Requires="p14">
       <p:transition/>
     </mc:Choice>
-    <mc:Fallback xmlns:dsp="http://schemas.microsoft.com/office/drawing/2008/diagram" xmlns:dgm="http://schemas.openxmlformats.org/drawingml/2006/diagram" xmlns:c="http://schemas.openxmlformats.org/drawingml/2006/chart" xmlns="">
+    <mc:Fallback xmlns="" xmlns:c="http://schemas.openxmlformats.org/drawingml/2006/chart" xmlns:dgm="http://schemas.openxmlformats.org/drawingml/2006/diagram" xmlns:dsp="http://schemas.microsoft.com/office/drawing/2008/diagram">
       <p:transition/>
     </mc:Fallback>
   </mc:AlternateContent>
@@ -2587,7 +2587,7 @@
     <mc:Choice Requires="p14">
       <p:transition/>
     </mc:Choice>
-    <mc:Fallback xmlns:dsp="http://schemas.microsoft.com/office/drawing/2008/diagram" xmlns:dgm="http://schemas.openxmlformats.org/drawingml/2006/diagram" xmlns:c="http://schemas.openxmlformats.org/drawingml/2006/chart" xmlns="">
+    <mc:Fallback xmlns="" xmlns:c="http://schemas.openxmlformats.org/drawingml/2006/chart" xmlns:dgm="http://schemas.openxmlformats.org/drawingml/2006/diagram" xmlns:dsp="http://schemas.microsoft.com/office/drawing/2008/diagram">
       <p:transition/>
     </mc:Fallback>
   </mc:AlternateContent>
@@ -2935,7 +2935,7 @@
     <mc:Choice Requires="p14">
       <p:transition/>
     </mc:Choice>
-    <mc:Fallback xmlns:dsp="http://schemas.microsoft.com/office/drawing/2008/diagram" xmlns:dgm="http://schemas.openxmlformats.org/drawingml/2006/diagram" xmlns:c="http://schemas.openxmlformats.org/drawingml/2006/chart" xmlns="">
+    <mc:Fallback xmlns="" xmlns:c="http://schemas.openxmlformats.org/drawingml/2006/chart" xmlns:dgm="http://schemas.openxmlformats.org/drawingml/2006/diagram" xmlns:dsp="http://schemas.microsoft.com/office/drawing/2008/diagram">
       <p:transition/>
     </mc:Fallback>
   </mc:AlternateContent>
@@ -3134,7 +3134,7 @@
     <mc:Choice Requires="p14">
       <p:transition/>
     </mc:Choice>
-    <mc:Fallback xmlns:dsp="http://schemas.microsoft.com/office/drawing/2008/diagram" xmlns:dgm="http://schemas.openxmlformats.org/drawingml/2006/diagram" xmlns:c="http://schemas.openxmlformats.org/drawingml/2006/chart" xmlns="">
+    <mc:Fallback xmlns="" xmlns:c="http://schemas.openxmlformats.org/drawingml/2006/chart" xmlns:dgm="http://schemas.openxmlformats.org/drawingml/2006/diagram" xmlns:dsp="http://schemas.microsoft.com/office/drawing/2008/diagram">
       <p:transition/>
     </mc:Fallback>
   </mc:AlternateContent>
@@ -3403,7 +3403,7 @@
     <mc:Choice Requires="p14">
       <p:transition/>
     </mc:Choice>
-    <mc:Fallback xmlns:dsp="http://schemas.microsoft.com/office/drawing/2008/diagram" xmlns:dgm="http://schemas.openxmlformats.org/drawingml/2006/diagram" xmlns:c="http://schemas.openxmlformats.org/drawingml/2006/chart" xmlns="">
+    <mc:Fallback xmlns="" xmlns:c="http://schemas.openxmlformats.org/drawingml/2006/chart" xmlns:dgm="http://schemas.openxmlformats.org/drawingml/2006/diagram" xmlns:dsp="http://schemas.microsoft.com/office/drawing/2008/diagram">
       <p:transition/>
     </mc:Fallback>
   </mc:AlternateContent>
@@ -3837,7 +3837,7 @@
     <mc:Choice Requires="p14">
       <p:transition/>
     </mc:Choice>
-    <mc:Fallback xmlns:dsp="http://schemas.microsoft.com/office/drawing/2008/diagram" xmlns:dgm="http://schemas.openxmlformats.org/drawingml/2006/diagram" xmlns:c="http://schemas.openxmlformats.org/drawingml/2006/chart" xmlns="">
+    <mc:Fallback xmlns="" xmlns:c="http://schemas.openxmlformats.org/drawingml/2006/chart" xmlns:dgm="http://schemas.openxmlformats.org/drawingml/2006/diagram" xmlns:dsp="http://schemas.microsoft.com/office/drawing/2008/diagram">
       <p:transition/>
     </mc:Fallback>
   </mc:AlternateContent>
@@ -3919,7 +3919,7 @@
         <p:spPr>
           <a:xfrm>
             <a:off x="1007029" y="1962721"/>
-            <a:ext cx="18073156" cy="5432256"/>
+            <a:ext cx="18073156" cy="8148384"/>
           </a:xfrm>
           <a:prstGeom prst="rect">
             <a:avLst/>
@@ -4085,14 +4085,62 @@
               <a:rPr lang="en-US" altLang="ko-KR" sz="4350" b="1" spc="-325" dirty="0" smtClean="0">
                 <a:latin typeface="나눔고딕OTF ExtraBold"/>
               </a:rPr>
-              <a:t>-&gt; YoloV2(detection) + </a:t>
+              <a:t>-&gt; YoloV2(detection) + VGG19(train</a:t>
             </a:r>
             <a:r>
               <a:rPr lang="en-US" altLang="ko-KR" sz="4350" b="1" spc="-325" dirty="0" smtClean="0">
                 <a:latin typeface="나눔고딕OTF ExtraBold"/>
               </a:rPr>
-              <a:t>VGG19(train)</a:t>
-            </a:r>
+              <a:t>)</a:t>
+            </a:r>
+          </a:p>
+          <a:p>
+            <a:pPr marL="12700">
+              <a:lnSpc>
+                <a:spcPct val="100000"/>
+              </a:lnSpc>
+              <a:spcBef>
+                <a:spcPts val="100"/>
+              </a:spcBef>
+              <a:defRPr/>
+            </a:pPr>
+            <a:endParaRPr lang="en-US" altLang="ko-KR" sz="4350" b="1" spc="-325" dirty="0">
+              <a:latin typeface="나눔고딕OTF ExtraBold"/>
+            </a:endParaRPr>
+          </a:p>
+          <a:p>
+            <a:pPr marL="12700">
+              <a:lnSpc>
+                <a:spcPct val="100000"/>
+              </a:lnSpc>
+              <a:spcBef>
+                <a:spcPts val="100"/>
+              </a:spcBef>
+              <a:defRPr/>
+            </a:pPr>
+            <a:r>
+              <a:rPr lang="en-US" altLang="ko-KR" sz="4350" b="1" spc="-325" dirty="0">
+                <a:latin typeface="나눔고딕OTF ExtraBold"/>
+              </a:rPr>
+              <a:t>Automatic Detection of Knee Joints and Quantiﬁcation of Knee Osteoarthritis </a:t>
+            </a:r>
+            <a:r>
+              <a:rPr lang="en-US" altLang="ko-KR" sz="4350" b="1" spc="-325" dirty="0" smtClean="0">
+                <a:latin typeface="나눔고딕OTF ExtraBold"/>
+              </a:rPr>
+              <a:t>Severity</a:t>
+            </a:r>
+          </a:p>
+          <a:p>
+            <a:pPr marL="12700">
+              <a:lnSpc>
+                <a:spcPct val="100000"/>
+              </a:lnSpc>
+              <a:spcBef>
+                <a:spcPts val="100"/>
+              </a:spcBef>
+              <a:defRPr/>
+            </a:pPr>
             <a:endParaRPr lang="ko-KR" altLang="en-US" sz="4350" b="1" spc="-325" dirty="0">
               <a:latin typeface="나눔고딕OTF ExtraBold"/>
             </a:endParaRPr>
@@ -4180,7 +4228,7 @@
     <mc:Choice Requires="p14">
       <p:transition/>
     </mc:Choice>
-    <mc:Fallback xmlns:dsp="http://schemas.microsoft.com/office/drawing/2008/diagram" xmlns:dgm="http://schemas.openxmlformats.org/drawingml/2006/diagram" xmlns:c="http://schemas.openxmlformats.org/drawingml/2006/chart" xmlns="">
+    <mc:Fallback xmlns="" xmlns:c="http://schemas.openxmlformats.org/drawingml/2006/chart" xmlns:dgm="http://schemas.openxmlformats.org/drawingml/2006/diagram" xmlns:dsp="http://schemas.microsoft.com/office/drawing/2008/diagram">
       <p:transition/>
     </mc:Fallback>
   </mc:AlternateContent>
@@ -4298,10 +4346,6 @@
               </a:rPr>
               <a:t>?</a:t>
             </a:r>
-            <a:endParaRPr lang="en-US" altLang="ko-KR" sz="4350" b="1" spc="-325" dirty="0" smtClean="0">
-              <a:latin typeface="나눔고딕OTF ExtraBold"/>
-              <a:cs typeface="나눔고딕OTF ExtraBold"/>
-            </a:endParaRPr>
           </a:p>
           <a:p>
             <a:pPr marL="12700">
@@ -4370,21 +4414,7 @@
                 <a:latin typeface="나눔고딕OTF ExtraBold"/>
                 <a:cs typeface="나눔고딕OTF ExtraBold"/>
               </a:rPr>
-              <a:t>된 결과 이미지를 </a:t>
-            </a:r>
-            <a:r>
-              <a:rPr lang="ko-KR" altLang="en-US" sz="4350" b="1" spc="-325" dirty="0" smtClean="0">
-                <a:latin typeface="나눔고딕OTF ExtraBold"/>
-                <a:cs typeface="나눔고딕OTF ExtraBold"/>
-              </a:rPr>
-              <a:t>학습 </a:t>
-            </a:r>
-            <a:r>
-              <a:rPr lang="ko-KR" altLang="en-US" sz="4350" b="1" spc="-325" dirty="0" smtClean="0">
-                <a:latin typeface="나눔고딕OTF ExtraBold"/>
-                <a:cs typeface="나눔고딕OTF ExtraBold"/>
-              </a:rPr>
-              <a:t>데이터셋으로 사용</a:t>
+              <a:t>된 결과 이미지를 학습 데이터셋으로 사용</a:t>
             </a:r>
             <a:endParaRPr lang="en-US" altLang="ko-KR" sz="4350" b="1" spc="-325" dirty="0" smtClean="0">
               <a:latin typeface="나눔고딕OTF ExtraBold"/>
@@ -4470,14 +4500,7 @@
                 <a:latin typeface="나눔고딕OTF ExtraBold"/>
                 <a:cs typeface="나눔고딕OTF ExtraBold"/>
               </a:rPr>
-              <a:t>에서 </a:t>
-            </a:r>
-            <a:r>
-              <a:rPr lang="ko-KR" altLang="en-US" sz="4350" b="1" spc="-325" dirty="0" smtClean="0">
-                <a:latin typeface="나눔고딕OTF ExtraBold"/>
-                <a:cs typeface="나눔고딕OTF ExtraBold"/>
-              </a:rPr>
-              <a:t>제공하는 학습데이터셋을 검증</a:t>
+              <a:t>에서 제공하는 학습데이터셋을 검증</a:t>
             </a:r>
             <a:r>
               <a:rPr lang="en-US" altLang="ko-KR" sz="4350" b="1" spc="-325" dirty="0" smtClean="0">
@@ -4491,14 +4514,7 @@
                 <a:latin typeface="나눔고딕OTF ExtraBold"/>
                 <a:cs typeface="나눔고딕OTF ExtraBold"/>
               </a:rPr>
-              <a:t>테스트 데이터셋으로 나누어 </a:t>
-            </a:r>
-            <a:r>
-              <a:rPr lang="ko-KR" altLang="en-US" sz="4350" b="1" spc="-325" dirty="0" smtClean="0">
-                <a:latin typeface="나눔고딕OTF ExtraBold"/>
-                <a:cs typeface="나눔고딕OTF ExtraBold"/>
-              </a:rPr>
-              <a:t>사용</a:t>
+              <a:t>테스트 데이터셋으로 나누어 사용</a:t>
             </a:r>
             <a:endParaRPr lang="en-US" altLang="ko-KR" sz="4350" b="1" spc="-325" dirty="0" smtClean="0">
               <a:latin typeface="나눔고딕OTF ExtraBold"/>
@@ -4574,14 +4590,7 @@
                 <a:latin typeface="나눔고딕OTF ExtraBold"/>
                 <a:cs typeface="나눔고딕OTF ExtraBold"/>
               </a:rPr>
-              <a:t>추후 </a:t>
-            </a:r>
-            <a:r>
-              <a:rPr lang="ko-KR" altLang="en-US" sz="4350" b="1" spc="-325" dirty="0" smtClean="0">
-                <a:latin typeface="나눔고딕OTF ExtraBold"/>
-                <a:cs typeface="나눔고딕OTF ExtraBold"/>
-              </a:rPr>
-              <a:t>검증 </a:t>
+              <a:t>추후 검증 </a:t>
             </a:r>
             <a:r>
               <a:rPr lang="ko-KR" altLang="en-US" sz="4350" b="1" spc="-325" dirty="0" err="1" smtClean="0">
@@ -4595,14 +4604,7 @@
                 <a:latin typeface="나눔고딕OTF ExtraBold"/>
                 <a:cs typeface="나눔고딕OTF ExtraBold"/>
               </a:rPr>
-              <a:t> </a:t>
-            </a:r>
-            <a:r>
-              <a:rPr lang="ko-KR" altLang="en-US" sz="4350" b="1" spc="-325" dirty="0" smtClean="0">
-                <a:latin typeface="나눔고딕OTF ExtraBold"/>
-                <a:cs typeface="나눔고딕OTF ExtraBold"/>
-              </a:rPr>
-              <a:t>추가 학습</a:t>
+              <a:t> 추가 학습</a:t>
             </a:r>
             <a:endParaRPr lang="en-US" altLang="ko-KR" sz="4350" b="1" spc="-325" dirty="0" smtClean="0">
               <a:latin typeface="나눔고딕OTF ExtraBold"/>
@@ -4687,7 +4689,7 @@
     <mc:Choice Requires="p14">
       <p:transition/>
     </mc:Choice>
-    <mc:Fallback xmlns:dsp="http://schemas.microsoft.com/office/drawing/2008/diagram" xmlns:dgm="http://schemas.openxmlformats.org/drawingml/2006/diagram" xmlns:c="http://schemas.openxmlformats.org/drawingml/2006/chart" xmlns="">
+    <mc:Fallback xmlns="" xmlns:c="http://schemas.openxmlformats.org/drawingml/2006/chart" xmlns:dgm="http://schemas.openxmlformats.org/drawingml/2006/diagram" xmlns:dsp="http://schemas.microsoft.com/office/drawing/2008/diagram">
       <p:transition/>
     </mc:Fallback>
   </mc:AlternateContent>
@@ -5076,7 +5078,7 @@
     <mc:Choice Requires="p14">
       <p:transition/>
     </mc:Choice>
-    <mc:Fallback xmlns:dsp="http://schemas.microsoft.com/office/drawing/2008/diagram" xmlns:dgm="http://schemas.openxmlformats.org/drawingml/2006/diagram" xmlns:c="http://schemas.openxmlformats.org/drawingml/2006/chart" xmlns="">
+    <mc:Fallback xmlns="" xmlns:c="http://schemas.openxmlformats.org/drawingml/2006/chart" xmlns:dgm="http://schemas.openxmlformats.org/drawingml/2006/diagram" xmlns:dsp="http://schemas.microsoft.com/office/drawing/2008/diagram">
       <p:transition/>
     </mc:Fallback>
   </mc:AlternateContent>
@@ -5496,7 +5498,7 @@
     <mc:Choice Requires="p14">
       <p:transition/>
     </mc:Choice>
-    <mc:Fallback xmlns:dsp="http://schemas.microsoft.com/office/drawing/2008/diagram" xmlns:dgm="http://schemas.openxmlformats.org/drawingml/2006/diagram" xmlns:c="http://schemas.openxmlformats.org/drawingml/2006/chart" xmlns="">
+    <mc:Fallback xmlns="" xmlns:c="http://schemas.openxmlformats.org/drawingml/2006/chart" xmlns:dgm="http://schemas.openxmlformats.org/drawingml/2006/diagram" xmlns:dsp="http://schemas.microsoft.com/office/drawing/2008/diagram">
       <p:transition/>
     </mc:Fallback>
   </mc:AlternateContent>
@@ -6057,17 +6059,6 @@
                         </a:rPr>
                         <a:t>0.00001, </a:t>
                       </a:r>
-                      <a:r>
-                        <a:rPr lang="en-US" altLang="ko-KR" sz="2800" b="1" kern="1200" spc="0" dirty="0" smtClean="0">
-                          <a:solidFill>
-                            <a:schemeClr val="tx1"/>
-                          </a:solidFill>
-                          <a:latin typeface="Arial"/>
-                          <a:ea typeface="+mj-ea"/>
-                          <a:cs typeface="Arial"/>
-                        </a:rPr>
-                        <a:t/>
-                      </a:r>
                       <a:br>
                         <a:rPr lang="en-US" altLang="ko-KR" sz="2800" b="1" kern="1200" spc="0" dirty="0" smtClean="0">
                           <a:solidFill>
@@ -6087,18 +6078,7 @@
                           <a:ea typeface="+mj-ea"/>
                           <a:cs typeface="Arial"/>
                         </a:rPr>
-                        <a:t>decay </a:t>
-                      </a:r>
-                      <a:r>
-                        <a:rPr lang="en-US" altLang="ko-KR" sz="2800" b="1" kern="1200" spc="0" dirty="0" smtClean="0">
-                          <a:solidFill>
-                            <a:schemeClr val="tx1"/>
-                          </a:solidFill>
-                          <a:latin typeface="Arial"/>
-                          <a:ea typeface="+mj-ea"/>
-                          <a:cs typeface="Arial"/>
-                        </a:rPr>
-                        <a:t>= </a:t>
+                        <a:t>decay = </a:t>
                       </a:r>
                       <a:r>
                         <a:rPr lang="en-US" altLang="ko-KR" sz="2800" b="1" dirty="0" smtClean="0">
@@ -7218,7 +7198,7 @@
     <mc:Choice Requires="p14">
       <p:transition/>
     </mc:Choice>
-    <mc:Fallback xmlns:dsp="http://schemas.microsoft.com/office/drawing/2008/diagram" xmlns:dgm="http://schemas.openxmlformats.org/drawingml/2006/diagram" xmlns:c="http://schemas.openxmlformats.org/drawingml/2006/chart" xmlns="">
+    <mc:Fallback xmlns="" xmlns:c="http://schemas.openxmlformats.org/drawingml/2006/chart" xmlns:dgm="http://schemas.openxmlformats.org/drawingml/2006/diagram" xmlns:dsp="http://schemas.microsoft.com/office/drawing/2008/diagram">
       <p:transition/>
     </mc:Fallback>
   </mc:AlternateContent>
@@ -7414,14 +7394,7 @@
                 <a:latin typeface="나눔고딕OTF ExtraBold"/>
                 <a:cs typeface="Arial"/>
               </a:rPr>
-              <a:t>통한 특징 </a:t>
-            </a:r>
-            <a:r>
-              <a:rPr lang="ko-KR" altLang="en-US" sz="4350" b="1" spc="-325" dirty="0" smtClean="0">
-                <a:latin typeface="나눔고딕OTF ExtraBold"/>
-                <a:cs typeface="Arial"/>
-              </a:rPr>
-              <a:t>응집</a:t>
+              <a:t>통한 특징 응집</a:t>
             </a:r>
             <a:endParaRPr sz="4350" b="1" spc="-270" dirty="0">
               <a:latin typeface="Arial"/>
@@ -7561,7 +7534,7 @@
           <p:nvPr>
             <p:extLst>
               <p:ext uri="{D42A27DB-BD31-4B8C-83A1-F6EECF244321}">
-                <p14:modId xmlns:p14="http://schemas.microsoft.com/office/powerpoint/2010/main" val="478708300"/>
+                <p14:modId xmlns:p14="http://schemas.microsoft.com/office/powerpoint/2010/main" val="2728834847"/>
               </p:ext>
             </p:extLst>
           </p:nvPr>
@@ -10637,7 +10610,7 @@
     <mc:Choice Requires="p14">
       <p:transition/>
     </mc:Choice>
-    <mc:Fallback xmlns:dsp="http://schemas.microsoft.com/office/drawing/2008/diagram" xmlns:dgm="http://schemas.openxmlformats.org/drawingml/2006/diagram" xmlns:c="http://schemas.openxmlformats.org/drawingml/2006/chart" xmlns="">
+    <mc:Fallback xmlns="" xmlns:c="http://schemas.openxmlformats.org/drawingml/2006/chart" xmlns:dgm="http://schemas.openxmlformats.org/drawingml/2006/diagram" xmlns:dsp="http://schemas.microsoft.com/office/drawing/2008/diagram">
       <p:transition/>
     </mc:Fallback>
   </mc:AlternateContent>

</xml_diff>